<commit_message>
Added climate data slides
</commit_message>
<xml_diff>
--- a/Presentations/National Parks Visitations Five Minute Presentation(1).pptx
+++ b/Presentations/National Parks Visitations Five Minute Presentation(1).pptx
@@ -1377,7 +1377,7 @@
         </p:nvSpPr>
         <p:spPr>
           <a:xfrm>
-            <a:off x="381300" y="685800"/>
+            <a:off x="381000" y="685800"/>
             <a:ext cx="6096000" cy="3429000"/>
           </a:xfrm>
           <a:custGeom>
@@ -10620,16 +10620,178 @@
           </a:bodyPr>
           <a:lstStyle/>
           <a:p>
-            <a:pPr marL="0" lvl="0" indent="0" algn="l" rtl="0">
-              <a:spcBef>
-                <a:spcPts val="0"/>
-              </a:spcBef>
-              <a:spcAft>
-                <a:spcPts val="1600"/>
-              </a:spcAft>
-              <a:buNone/>
-            </a:pPr>
-            <a:endParaRPr/>
+            <a:pPr marL="0" indent="0">
+              <a:buFont typeface="Lato"/>
+              <a:buNone/>
+            </a:pPr>
+            <a:r>
+              <a:rPr lang="en-US" sz="1200" b="1" dirty="0"/>
+              <a:t>2 Data Sources (National Oceanic and Atmospheric Administration):</a:t>
+            </a:r>
+          </a:p>
+          <a:p>
+            <a:pPr marL="171450" indent="-171450">
+              <a:buFont typeface="Wingdings" panose="05000000000000000000" pitchFamily="2" charset="2"/>
+              <a:buChar char="Ø"/>
+            </a:pPr>
+            <a:r>
+              <a:rPr lang="en-US" sz="1100" dirty="0"/>
+              <a:t>National Climactic Data Center (NCDC</a:t>
+            </a:r>
+            <a:r>
+              <a:rPr lang="en-US" sz="1100"/>
+              <a:t>) Monthly Precipitation </a:t>
+            </a:r>
+            <a:r>
+              <a:rPr lang="en-US" sz="1100" dirty="0"/>
+              <a:t>Data</a:t>
+            </a:r>
+          </a:p>
+          <a:p>
+            <a:pPr marL="628650" lvl="1" indent="-171450">
+              <a:spcBef>
+                <a:spcPts val="0"/>
+              </a:spcBef>
+              <a:buFont typeface="Arial" panose="020B0604020202020204" pitchFamily="34" charset="0"/>
+              <a:buChar char="•"/>
+            </a:pPr>
+            <a:r>
+              <a:rPr lang="en-US" dirty="0"/>
+              <a:t>Station name</a:t>
+            </a:r>
+          </a:p>
+          <a:p>
+            <a:pPr marL="628650" lvl="1" indent="-171450">
+              <a:spcBef>
+                <a:spcPts val="0"/>
+              </a:spcBef>
+              <a:buFont typeface="Arial" panose="020B0604020202020204" pitchFamily="34" charset="0"/>
+              <a:buChar char="•"/>
+            </a:pPr>
+            <a:r>
+              <a:rPr lang="en-US" dirty="0"/>
+              <a:t>Precipitation amount</a:t>
+            </a:r>
+          </a:p>
+          <a:p>
+            <a:pPr marL="628650" lvl="1" indent="-171450">
+              <a:spcBef>
+                <a:spcPts val="0"/>
+              </a:spcBef>
+              <a:buFont typeface="Arial" panose="020B0604020202020204" pitchFamily="34" charset="0"/>
+              <a:buChar char="•"/>
+            </a:pPr>
+            <a:r>
+              <a:rPr lang="en-US" dirty="0"/>
+              <a:t>Requests limited to 1 county and 1 year per pull</a:t>
+            </a:r>
+          </a:p>
+          <a:p>
+            <a:pPr marL="628650" lvl="1" indent="-171450">
+              <a:spcBef>
+                <a:spcPts val="0"/>
+              </a:spcBef>
+              <a:buFont typeface="Arial" panose="020B0604020202020204" pitchFamily="34" charset="0"/>
+              <a:buChar char="•"/>
+            </a:pPr>
+            <a:r>
+              <a:rPr lang="en-US" dirty="0"/>
+              <a:t>1985-2018 used</a:t>
+            </a:r>
+          </a:p>
+          <a:p>
+            <a:pPr marL="628650" lvl="1" indent="-171450">
+              <a:spcBef>
+                <a:spcPts val="0"/>
+              </a:spcBef>
+              <a:buFont typeface="Arial" panose="020B0604020202020204" pitchFamily="34" charset="0"/>
+              <a:buChar char="•"/>
+            </a:pPr>
+            <a:r>
+              <a:rPr lang="en-US" dirty="0"/>
+              <a:t>80,800 county-years used</a:t>
+            </a:r>
+          </a:p>
+          <a:p>
+            <a:pPr marL="171450" indent="-171450">
+              <a:buFont typeface="Wingdings" panose="05000000000000000000" pitchFamily="2" charset="2"/>
+              <a:buChar char="Ø"/>
+            </a:pPr>
+            <a:r>
+              <a:rPr lang="en-US" sz="1100" dirty="0"/>
+              <a:t>NCDC Station Location Data</a:t>
+            </a:r>
+          </a:p>
+          <a:p>
+            <a:pPr marL="628650" lvl="1" indent="-171450">
+              <a:spcBef>
+                <a:spcPts val="0"/>
+              </a:spcBef>
+              <a:buFont typeface="Arial" panose="020B0604020202020204" pitchFamily="34" charset="0"/>
+              <a:buChar char="•"/>
+            </a:pPr>
+            <a:r>
+              <a:rPr lang="en-US" dirty="0"/>
+              <a:t>Station Name</a:t>
+            </a:r>
+          </a:p>
+          <a:p>
+            <a:pPr marL="628650" lvl="1" indent="-171450">
+              <a:spcBef>
+                <a:spcPts val="0"/>
+              </a:spcBef>
+              <a:buFont typeface="Arial" panose="020B0604020202020204" pitchFamily="34" charset="0"/>
+              <a:buChar char="•"/>
+            </a:pPr>
+            <a:r>
+              <a:rPr lang="en-US" dirty="0"/>
+              <a:t>Latitude</a:t>
+            </a:r>
+          </a:p>
+          <a:p>
+            <a:pPr marL="628650" lvl="1" indent="-171450">
+              <a:spcBef>
+                <a:spcPts val="0"/>
+              </a:spcBef>
+              <a:buFont typeface="Arial" panose="020B0604020202020204" pitchFamily="34" charset="0"/>
+              <a:buChar char="•"/>
+            </a:pPr>
+            <a:r>
+              <a:rPr lang="en-US" dirty="0"/>
+              <a:t>Longitude</a:t>
+            </a:r>
+          </a:p>
+          <a:p>
+            <a:pPr marL="628650" lvl="1" indent="-171450">
+              <a:spcBef>
+                <a:spcPts val="0"/>
+              </a:spcBef>
+              <a:buFont typeface="Arial" panose="020B0604020202020204" pitchFamily="34" charset="0"/>
+              <a:buChar char="•"/>
+            </a:pPr>
+            <a:r>
+              <a:rPr lang="en-US" dirty="0"/>
+              <a:t>40,000 stations used</a:t>
+            </a:r>
+          </a:p>
+          <a:p>
+            <a:pPr marL="171450" indent="-171450">
+              <a:buFont typeface="Arial" panose="020B0604020202020204" pitchFamily="34" charset="0"/>
+              <a:buChar char="•"/>
+            </a:pPr>
+            <a:r>
+              <a:rPr lang="en-US" sz="1100" dirty="0"/>
+              <a:t>Limited to 10,000 pulls per day</a:t>
+            </a:r>
+          </a:p>
+          <a:p>
+            <a:pPr marL="0" indent="0">
+              <a:lnSpc>
+                <a:spcPct val="100000"/>
+              </a:lnSpc>
+              <a:buNone/>
+            </a:pPr>
+            <a:endParaRPr lang="en-US" b="1" dirty="0"/>
           </a:p>
         </p:txBody>
       </p:sp>
@@ -10658,6 +10820,58 @@
           </a:bodyPr>
           <a:lstStyle/>
           <a:p>
+            <a:pPr marL="0" indent="0">
+              <a:buFont typeface="Lato"/>
+              <a:buNone/>
+            </a:pPr>
+            <a:r>
+              <a:rPr lang="en-US" sz="1400" dirty="0"/>
+              <a:t>Initial data processing required:</a:t>
+            </a:r>
+          </a:p>
+          <a:p>
+            <a:pPr marL="171450" indent="-171450"/>
+            <a:r>
+              <a:rPr lang="en-US" sz="1400" dirty="0"/>
+              <a:t>Accessing the API county-by-county and year by year</a:t>
+            </a:r>
+          </a:p>
+          <a:p>
+            <a:pPr marL="171450" indent="-171450"/>
+            <a:r>
+              <a:rPr lang="en-US" sz="1400" dirty="0"/>
+              <a:t>Combining many data sets together due to restrictions</a:t>
+            </a:r>
+          </a:p>
+          <a:p>
+            <a:pPr marL="171450" indent="-171450"/>
+            <a:r>
+              <a:rPr lang="en-US" sz="1400" dirty="0"/>
+              <a:t>Running in parallel due to massive amounts of data</a:t>
+            </a:r>
+          </a:p>
+          <a:p>
+            <a:pPr marL="0" indent="0">
+              <a:spcBef>
+                <a:spcPts val="1600"/>
+              </a:spcBef>
+              <a:buFont typeface="Lato"/>
+              <a:buNone/>
+            </a:pPr>
+            <a:r>
+              <a:rPr lang="en-US" dirty="0"/>
+              <a:t>Results in </a:t>
+            </a:r>
+            <a:r>
+              <a:rPr lang="en-US" b="1" i="1" u="sng" dirty="0"/>
+              <a:t>one line per month per station </a:t>
+            </a:r>
+            <a:r>
+              <a:rPr lang="en-US" dirty="0"/>
+              <a:t>on which the other data collected would be merged.</a:t>
+            </a:r>
+          </a:p>
+          <a:p>
             <a:pPr marL="0" lvl="0" indent="0" algn="l" rtl="0">
               <a:spcBef>
                 <a:spcPts val="0"/>
@@ -10667,7 +10881,7 @@
               </a:spcAft>
               <a:buNone/>
             </a:pPr>
-            <a:endParaRPr/>
+            <a:endParaRPr dirty="0"/>
           </a:p>
         </p:txBody>
       </p:sp>

</xml_diff>